<commit_message>
updated code in attempt5 folder
</commit_message>
<xml_diff>
--- a/Attempt5_allcombinations_100reps/Figures/sampling.pptx
+++ b/Attempt5_allcombinations_100reps/Figures/sampling.pptx
@@ -261,7 +261,7 @@
           <a:p>
             <a:fld id="{0B1F5AC1-8606-4CD7-AA4E-C724948A05F2}" type="datetimeFigureOut">
               <a:rPr lang="en-US" smtClean="0"/>
-              <a:t>8/3/2020</a:t>
+              <a:t>8/5/2020</a:t>
             </a:fld>
             <a:endParaRPr lang="en-US"/>
           </a:p>
@@ -459,7 +459,7 @@
           <a:p>
             <a:fld id="{0B1F5AC1-8606-4CD7-AA4E-C724948A05F2}" type="datetimeFigureOut">
               <a:rPr lang="en-US" smtClean="0"/>
-              <a:t>8/3/2020</a:t>
+              <a:t>8/5/2020</a:t>
             </a:fld>
             <a:endParaRPr lang="en-US"/>
           </a:p>
@@ -667,7 +667,7 @@
           <a:p>
             <a:fld id="{0B1F5AC1-8606-4CD7-AA4E-C724948A05F2}" type="datetimeFigureOut">
               <a:rPr lang="en-US" smtClean="0"/>
-              <a:t>8/3/2020</a:t>
+              <a:t>8/5/2020</a:t>
             </a:fld>
             <a:endParaRPr lang="en-US"/>
           </a:p>
@@ -865,7 +865,7 @@
           <a:p>
             <a:fld id="{0B1F5AC1-8606-4CD7-AA4E-C724948A05F2}" type="datetimeFigureOut">
               <a:rPr lang="en-US" smtClean="0"/>
-              <a:t>8/3/2020</a:t>
+              <a:t>8/5/2020</a:t>
             </a:fld>
             <a:endParaRPr lang="en-US"/>
           </a:p>
@@ -1140,7 +1140,7 @@
           <a:p>
             <a:fld id="{0B1F5AC1-8606-4CD7-AA4E-C724948A05F2}" type="datetimeFigureOut">
               <a:rPr lang="en-US" smtClean="0"/>
-              <a:t>8/3/2020</a:t>
+              <a:t>8/5/2020</a:t>
             </a:fld>
             <a:endParaRPr lang="en-US"/>
           </a:p>
@@ -1405,7 +1405,7 @@
           <a:p>
             <a:fld id="{0B1F5AC1-8606-4CD7-AA4E-C724948A05F2}" type="datetimeFigureOut">
               <a:rPr lang="en-US" smtClean="0"/>
-              <a:t>8/3/2020</a:t>
+              <a:t>8/5/2020</a:t>
             </a:fld>
             <a:endParaRPr lang="en-US"/>
           </a:p>
@@ -1817,7 +1817,7 @@
           <a:p>
             <a:fld id="{0B1F5AC1-8606-4CD7-AA4E-C724948A05F2}" type="datetimeFigureOut">
               <a:rPr lang="en-US" smtClean="0"/>
-              <a:t>8/3/2020</a:t>
+              <a:t>8/5/2020</a:t>
             </a:fld>
             <a:endParaRPr lang="en-US"/>
           </a:p>
@@ -1958,7 +1958,7 @@
           <a:p>
             <a:fld id="{0B1F5AC1-8606-4CD7-AA4E-C724948A05F2}" type="datetimeFigureOut">
               <a:rPr lang="en-US" smtClean="0"/>
-              <a:t>8/3/2020</a:t>
+              <a:t>8/5/2020</a:t>
             </a:fld>
             <a:endParaRPr lang="en-US"/>
           </a:p>
@@ -2071,7 +2071,7 @@
           <a:p>
             <a:fld id="{0B1F5AC1-8606-4CD7-AA4E-C724948A05F2}" type="datetimeFigureOut">
               <a:rPr lang="en-US" smtClean="0"/>
-              <a:t>8/3/2020</a:t>
+              <a:t>8/5/2020</a:t>
             </a:fld>
             <a:endParaRPr lang="en-US"/>
           </a:p>
@@ -2382,7 +2382,7 @@
           <a:p>
             <a:fld id="{0B1F5AC1-8606-4CD7-AA4E-C724948A05F2}" type="datetimeFigureOut">
               <a:rPr lang="en-US" smtClean="0"/>
-              <a:t>8/3/2020</a:t>
+              <a:t>8/5/2020</a:t>
             </a:fld>
             <a:endParaRPr lang="en-US"/>
           </a:p>
@@ -2670,7 +2670,7 @@
           <a:p>
             <a:fld id="{0B1F5AC1-8606-4CD7-AA4E-C724948A05F2}" type="datetimeFigureOut">
               <a:rPr lang="en-US" smtClean="0"/>
-              <a:t>8/3/2020</a:t>
+              <a:t>8/5/2020</a:t>
             </a:fld>
             <a:endParaRPr lang="en-US"/>
           </a:p>
@@ -2911,7 +2911,7 @@
           <a:p>
             <a:fld id="{0B1F5AC1-8606-4CD7-AA4E-C724948A05F2}" type="datetimeFigureOut">
               <a:rPr lang="en-US" smtClean="0"/>
-              <a:t>8/3/2020</a:t>
+              <a:t>8/5/2020</a:t>
             </a:fld>
             <a:endParaRPr lang="en-US"/>
           </a:p>
@@ -5515,8 +5515,8 @@
         </p:nvSpPr>
         <p:spPr>
           <a:xfrm>
-            <a:off x="6178037" y="218286"/>
-            <a:ext cx="1788252" cy="369332"/>
+            <a:off x="6334952" y="219147"/>
+            <a:ext cx="1788252" cy="461665"/>
           </a:xfrm>
           <a:prstGeom prst="rect">
             <a:avLst/>
@@ -5530,7 +5530,7 @@
           <a:lstStyle/>
           <a:p>
             <a:r>
-              <a:rPr lang="en-US" b="1" dirty="0">
+              <a:rPr lang="en-US" sz="2400" b="1" dirty="0">
                 <a:cs typeface="Times New Roman" panose="02020603050405020304" pitchFamily="18" charset="0"/>
               </a:rPr>
               <a:t>Proportional</a:t>
@@ -5552,8 +5552,8 @@
         </p:nvSpPr>
         <p:spPr>
           <a:xfrm>
-            <a:off x="4317632" y="244359"/>
-            <a:ext cx="1788252" cy="369332"/>
+            <a:off x="4038569" y="219148"/>
+            <a:ext cx="1788252" cy="461665"/>
           </a:xfrm>
           <a:prstGeom prst="rect">
             <a:avLst/>
@@ -5567,7 +5567,7 @@
           <a:lstStyle/>
           <a:p>
             <a:r>
-              <a:rPr lang="en-US" b="1" dirty="0">
+              <a:rPr lang="en-US" sz="2400" b="1" dirty="0">
                 <a:cs typeface="Times New Roman" panose="02020603050405020304" pitchFamily="18" charset="0"/>
               </a:rPr>
               <a:t>Equal</a:t>

</xml_diff>